<commit_message>
small bug fix in Week 7 lecture
</commit_message>
<xml_diff>
--- a/Week 7 -- spatiotemporal models/Lecture/Lecture 7 -- spatio-temporal models.pptx
+++ b/Week 7 -- spatiotemporal models/Lecture/Lecture 7 -- spatio-temporal models.pptx
@@ -214,7 +214,7 @@
           <a:p>
             <a:fld id="{1522831B-4FE3-4D45-950B-0D2C6BB2DD76}" type="datetimeFigureOut">
               <a:rPr lang="en-US" smtClean="0"/>
-              <a:t>5/9/2016</a:t>
+              <a:t>5/10/2016</a:t>
             </a:fld>
             <a:endParaRPr lang="en-US"/>
           </a:p>
@@ -5532,8 +5532,8 @@
           </a:p>
         </p:txBody>
       </p:sp>
-      <mc:AlternateContent xmlns:mc="http://schemas.openxmlformats.org/markup-compatibility/2006">
-        <mc:Choice xmlns:a14="http://schemas.microsoft.com/office/drawing/2010/main" Requires="a14">
+      <mc:AlternateContent xmlns:mc="http://schemas.openxmlformats.org/markup-compatibility/2006" xmlns:a14="http://schemas.microsoft.com/office/drawing/2010/main">
+        <mc:Choice Requires="a14">
           <p:sp>
             <p:nvSpPr>
               <p:cNvPr id="3" name="Content Placeholder 2"/>
@@ -5945,7 +5945,7 @@
             </p:txBody>
           </p:sp>
         </mc:Choice>
-        <mc:Fallback>
+        <mc:Fallback xmlns="">
           <p:sp>
             <p:nvSpPr>
               <p:cNvPr id="3" name="Content Placeholder 2"/>
@@ -5989,6 +5989,13 @@
   <p:clrMapOvr>
     <a:masterClrMapping/>
   </p:clrMapOvr>
+  <p:timing>
+    <p:tnLst>
+      <p:par>
+        <p:cTn id="1" dur="indefinite" restart="never" nodeType="tmRoot"/>
+      </p:par>
+    </p:tnLst>
+  </p:timing>
 </p:sld>
 </file>
 
@@ -7418,6 +7425,13 @@
   <p:clrMapOvr>
     <a:masterClrMapping/>
   </p:clrMapOvr>
+  <p:timing>
+    <p:tnLst>
+      <p:par>
+        <p:cTn id="1" dur="indefinite" restart="never" nodeType="tmRoot"/>
+      </p:par>
+    </p:tnLst>
+  </p:timing>
 </p:sld>
 </file>
 
@@ -7536,6 +7550,13 @@
   <p:clrMapOvr>
     <a:masterClrMapping/>
   </p:clrMapOvr>
+  <p:timing>
+    <p:tnLst>
+      <p:par>
+        <p:cTn id="1" dur="indefinite" restart="never" nodeType="tmRoot"/>
+      </p:par>
+    </p:tnLst>
+  </p:timing>
 </p:sld>
 </file>
 
@@ -13104,8 +13125,8 @@
           </a:p>
         </p:txBody>
       </p:sp>
-      <mc:AlternateContent xmlns:mc="http://schemas.openxmlformats.org/markup-compatibility/2006" xmlns:a14="http://schemas.microsoft.com/office/drawing/2010/main">
-        <mc:Choice Requires="a14">
+      <mc:AlternateContent xmlns:mc="http://schemas.openxmlformats.org/markup-compatibility/2006">
+        <mc:Choice xmlns:a14="http://schemas.microsoft.com/office/drawing/2010/main" Requires="a14">
           <p:sp>
             <p:nvSpPr>
               <p:cNvPr id="3" name="Content Placeholder 2"/>
@@ -13709,7 +13730,7 @@
                         <m:t>(</m:t>
                       </m:r>
                       <m:r>
-                        <a:rPr lang="en-US" b="1" i="1">
+                        <a:rPr lang="en-US" b="1" i="1" smtClean="0">
                           <a:latin typeface="Cambria Math" panose="02040503050406030204" pitchFamily="18" charset="0"/>
                           <a:ea typeface="Cambria Math" panose="02040503050406030204" pitchFamily="18" charset="0"/>
                         </a:rPr>
@@ -14018,7 +14039,7 @@
             </p:txBody>
           </p:sp>
         </mc:Choice>
-        <mc:Fallback xmlns="">
+        <mc:Fallback>
           <p:sp>
             <p:nvSpPr>
               <p:cNvPr id="3" name="Content Placeholder 2"/>
@@ -14273,8 +14294,8 @@
           </a:p>
         </p:txBody>
       </p:sp>
-      <mc:AlternateContent xmlns:mc="http://schemas.openxmlformats.org/markup-compatibility/2006" xmlns:a14="http://schemas.microsoft.com/office/drawing/2010/main">
-        <mc:Choice Requires="a14">
+      <mc:AlternateContent xmlns:mc="http://schemas.openxmlformats.org/markup-compatibility/2006">
+        <mc:Choice xmlns:a14="http://schemas.microsoft.com/office/drawing/2010/main" Requires="a14">
           <p:sp>
             <p:nvSpPr>
               <p:cNvPr id="3" name="Content Placeholder 2"/>
@@ -14348,13 +14369,13 @@
                         <a:rPr lang="en-US" b="0" i="0" smtClean="0">
                           <a:latin typeface="Cambria Math" panose="02040503050406030204" pitchFamily="18" charset="0"/>
                         </a:rPr>
-                        <m:t>Poisson</m:t>
+                        <m:t>Negative</m:t>
                       </m:r>
                       <m:r>
-                        <a:rPr lang="en-US" b="0" i="1" smtClean="0">
+                        <a:rPr lang="en-US" b="0" i="0" smtClean="0">
                           <a:latin typeface="Cambria Math" panose="02040503050406030204" pitchFamily="18" charset="0"/>
                         </a:rPr>
-                        <m:t>(</m:t>
+                        <m:t>_</m:t>
                       </m:r>
                       <m:r>
                         <m:rPr>
@@ -14363,77 +14384,89 @@
                         <a:rPr lang="en-US" b="0" i="0" smtClean="0">
                           <a:latin typeface="Cambria Math" panose="02040503050406030204" pitchFamily="18" charset="0"/>
                         </a:rPr>
-                        <m:t>exp</m:t>
+                        <m:t>Binomial</m:t>
                       </m:r>
                       <m:r>
                         <a:rPr lang="en-US" b="0" i="1" smtClean="0">
                           <a:latin typeface="Cambria Math" panose="02040503050406030204" pitchFamily="18" charset="0"/>
                         </a:rPr>
-                        <m:t>⁡(</m:t>
+                        <m:t>(</m:t>
                       </m:r>
-                      <m:sSub>
-                        <m:sSubPr>
+                      <m:func>
+                        <m:funcPr>
                           <m:ctrlPr>
                             <a:rPr lang="en-US" b="0" i="1" smtClean="0">
                               <a:latin typeface="Cambria Math" panose="02040503050406030204" pitchFamily="18" charset="0"/>
-                              <a:ea typeface="Cambria Math" panose="02040503050406030204" pitchFamily="18" charset="0"/>
                             </a:rPr>
                           </m:ctrlPr>
-                        </m:sSubPr>
+                        </m:funcPr>
+                        <m:fName>
+                          <m:r>
+                            <m:rPr>
+                              <m:sty m:val="p"/>
+                            </m:rPr>
+                            <a:rPr lang="en-US" b="0" i="0" smtClean="0">
+                              <a:latin typeface="Cambria Math" panose="02040503050406030204" pitchFamily="18" charset="0"/>
+                            </a:rPr>
+                            <m:t>exp</m:t>
+                          </m:r>
+                        </m:fName>
                         <m:e>
-                          <m:r>
-                            <a:rPr lang="en-US" b="0" i="1" smtClean="0">
-                              <a:latin typeface="Cambria Math" panose="02040503050406030204" pitchFamily="18" charset="0"/>
-                              <a:ea typeface="Cambria Math" panose="02040503050406030204" pitchFamily="18" charset="0"/>
-                            </a:rPr>
-                            <m:t>𝜆</m:t>
-                          </m:r>
+                          <m:d>
+                            <m:dPr>
+                              <m:ctrlPr>
+                                <a:rPr lang="en-US" b="0" i="1" smtClean="0">
+                                  <a:latin typeface="Cambria Math" panose="02040503050406030204" pitchFamily="18" charset="0"/>
+                                </a:rPr>
+                              </m:ctrlPr>
+                            </m:dPr>
+                            <m:e>
+                              <m:sSub>
+                                <m:sSubPr>
+                                  <m:ctrlPr>
+                                    <a:rPr lang="en-US" b="0" i="1" smtClean="0">
+                                      <a:latin typeface="Cambria Math" panose="02040503050406030204" pitchFamily="18" charset="0"/>
+                                      <a:ea typeface="Cambria Math" panose="02040503050406030204" pitchFamily="18" charset="0"/>
+                                    </a:rPr>
+                                  </m:ctrlPr>
+                                </m:sSubPr>
+                                <m:e>
+                                  <m:r>
+                                    <a:rPr lang="en-US" b="0" i="1" smtClean="0">
+                                      <a:latin typeface="Cambria Math" panose="02040503050406030204" pitchFamily="18" charset="0"/>
+                                      <a:ea typeface="Cambria Math" panose="02040503050406030204" pitchFamily="18" charset="0"/>
+                                    </a:rPr>
+                                    <m:t>𝜆</m:t>
+                                  </m:r>
+                                </m:e>
+                                <m:sub>
+                                  <m:r>
+                                    <a:rPr lang="en-US" b="0" i="1" smtClean="0">
+                                      <a:latin typeface="Cambria Math" panose="02040503050406030204" pitchFamily="18" charset="0"/>
+                                      <a:ea typeface="Cambria Math" panose="02040503050406030204" pitchFamily="18" charset="0"/>
+                                    </a:rPr>
+                                    <m:t>𝑖</m:t>
+                                  </m:r>
+                                </m:sub>
+                              </m:sSub>
+                            </m:e>
+                          </m:d>
                         </m:e>
-                        <m:sub>
-                          <m:r>
-                            <a:rPr lang="en-US" b="0" i="1" smtClean="0">
-                              <a:latin typeface="Cambria Math" panose="02040503050406030204" pitchFamily="18" charset="0"/>
-                              <a:ea typeface="Cambria Math" panose="02040503050406030204" pitchFamily="18" charset="0"/>
-                            </a:rPr>
-                            <m:t>𝑖</m:t>
-                          </m:r>
-                        </m:sub>
-                      </m:sSub>
+                      </m:func>
                       <m:r>
                         <a:rPr lang="en-US" b="0" i="1" smtClean="0">
                           <a:latin typeface="Cambria Math" panose="02040503050406030204" pitchFamily="18" charset="0"/>
                           <a:ea typeface="Cambria Math" panose="02040503050406030204" pitchFamily="18" charset="0"/>
                         </a:rPr>
-                        <m:t>), </m:t>
+                        <m:t>,</m:t>
                       </m:r>
-                      <m:sSup>
-                        <m:sSupPr>
-                          <m:ctrlPr>
-                            <a:rPr lang="en-US" b="0" i="1" smtClean="0">
-                              <a:latin typeface="Cambria Math" panose="02040503050406030204" pitchFamily="18" charset="0"/>
-                              <a:ea typeface="Cambria Math" panose="02040503050406030204" pitchFamily="18" charset="0"/>
-                            </a:rPr>
-                          </m:ctrlPr>
-                        </m:sSupPr>
-                        <m:e>
-                          <m:r>
-                            <a:rPr lang="en-US" b="0" i="1" smtClean="0">
-                              <a:latin typeface="Cambria Math" panose="02040503050406030204" pitchFamily="18" charset="0"/>
-                              <a:ea typeface="Cambria Math" panose="02040503050406030204" pitchFamily="18" charset="0"/>
-                            </a:rPr>
-                            <m:t>𝜎</m:t>
-                          </m:r>
-                        </m:e>
-                        <m:sup>
-                          <m:r>
-                            <a:rPr lang="en-US" b="0" i="1" smtClean="0">
-                              <a:latin typeface="Cambria Math" panose="02040503050406030204" pitchFamily="18" charset="0"/>
-                              <a:ea typeface="Cambria Math" panose="02040503050406030204" pitchFamily="18" charset="0"/>
-                            </a:rPr>
-                            <m:t>2</m:t>
-                          </m:r>
-                        </m:sup>
-                      </m:sSup>
+                      <m:r>
+                        <a:rPr lang="en-US" b="0" i="1" smtClean="0">
+                          <a:latin typeface="Cambria Math" panose="02040503050406030204" pitchFamily="18" charset="0"/>
+                          <a:ea typeface="Cambria Math" panose="02040503050406030204" pitchFamily="18" charset="0"/>
+                        </a:rPr>
+                        <m:t>𝑘</m:t>
+                      </m:r>
                       <m:r>
                         <a:rPr lang="en-US" b="0" i="1" smtClean="0">
                           <a:latin typeface="Cambria Math" panose="02040503050406030204" pitchFamily="18" charset="0"/>
@@ -15146,6 +15179,20 @@
                               </m:r>
                             </m:sub>
                           </m:sSub>
+                          <m:r>
+                            <a:rPr lang="en-US" b="0" i="1" smtClean="0">
+                              <a:latin typeface="Cambria Math" panose="02040503050406030204" pitchFamily="18" charset="0"/>
+                              <a:ea typeface="Cambria Math" panose="02040503050406030204" pitchFamily="18" charset="0"/>
+                            </a:rPr>
+                            <m:t>|</m:t>
+                          </m:r>
+                          <m:r>
+                            <a:rPr lang="en-US" b="0" i="1" smtClean="0">
+                              <a:latin typeface="Cambria Math" panose="02040503050406030204" pitchFamily="18" charset="0"/>
+                              <a:ea typeface="Cambria Math" panose="02040503050406030204" pitchFamily="18" charset="0"/>
+                            </a:rPr>
+                            <m:t>𝑡</m:t>
+                          </m:r>
                         </m:e>
                       </m:d>
                       <m:r>
@@ -15265,7 +15312,7 @@
             </p:txBody>
           </p:sp>
         </mc:Choice>
-        <mc:Fallback xmlns="">
+        <mc:Fallback>
           <p:sp>
             <p:nvSpPr>
               <p:cNvPr id="3" name="Content Placeholder 2"/>
@@ -16139,8 +16186,8 @@
           </a:p>
         </p:txBody>
       </p:sp>
-      <mc:AlternateContent xmlns:mc="http://schemas.openxmlformats.org/markup-compatibility/2006">
-        <mc:Choice xmlns:a14="http://schemas.microsoft.com/office/drawing/2010/main" Requires="a14">
+      <mc:AlternateContent xmlns:mc="http://schemas.openxmlformats.org/markup-compatibility/2006" xmlns:a14="http://schemas.microsoft.com/office/drawing/2010/main">
+        <mc:Choice Requires="a14">
           <p:sp>
             <p:nvSpPr>
               <p:cNvPr id="3" name="Content Placeholder 2"/>
@@ -16450,7 +16497,7 @@
             </p:txBody>
           </p:sp>
         </mc:Choice>
-        <mc:Fallback>
+        <mc:Fallback xmlns="">
           <p:sp>
             <p:nvSpPr>
               <p:cNvPr id="3" name="Content Placeholder 2"/>
@@ -16494,6 +16541,13 @@
   <p:clrMapOvr>
     <a:masterClrMapping/>
   </p:clrMapOvr>
+  <p:timing>
+    <p:tnLst>
+      <p:par>
+        <p:cTn id="1" dur="indefinite" restart="never" nodeType="tmRoot"/>
+      </p:par>
+    </p:tnLst>
+  </p:timing>
 </p:sld>
 </file>
 

</xml_diff>